<commit_message>
Lisasin oma nime 11.36
</commit_message>
<xml_diff>
--- a/Front_end_koolitus.pptx
+++ b/Front_end_koolitus.pptx
@@ -12134,15 +12134,37 @@
           <a:lstStyle/>
           <a:p>
             <a:r>
+              <a:rPr lang="et-EE" dirty="0" smtClean="0"/>
+              <a:t>Nimi</a:t>
+            </a:r>
+            <a:r>
+              <a:rPr lang="en-US" dirty="0" smtClean="0"/>
+              <a:t>: Rain </a:t>
+            </a:r>
+            <a:r>
+              <a:rPr lang="en-US" dirty="0" err="1" smtClean="0"/>
+              <a:t>Sirendi</a:t>
+            </a:r>
+            <a:endParaRPr lang="et-EE" dirty="0"/>
+          </a:p>
+          <a:p>
+            <a:r>
               <a:rPr lang="et-EE" dirty="0"/>
-              <a:t>Nimi</a:t>
-            </a:r>
-          </a:p>
-          <a:p>
-            <a:r>
-              <a:rPr lang="et-EE" dirty="0"/>
-              <a:t>Varasem kogemus</a:t>
-            </a:r>
+              <a:t>Varasem </a:t>
+            </a:r>
+            <a:r>
+              <a:rPr lang="et-EE" dirty="0" smtClean="0"/>
+              <a:t>kogemus</a:t>
+            </a:r>
+            <a:r>
+              <a:rPr lang="en-US" dirty="0" smtClean="0"/>
+              <a:t>: </a:t>
+            </a:r>
+            <a:r>
+              <a:rPr lang="en-US" smtClean="0"/>
+              <a:t>vähene</a:t>
+            </a:r>
+            <a:endParaRPr lang="et-EE" dirty="0"/>
           </a:p>
           <a:p>
             <a:endParaRPr lang="et-EE" dirty="0"/>

</xml_diff>

<commit_message>
Visual bug fix in power point
</commit_message>
<xml_diff>
--- a/Front_end_koolitus.pptx
+++ b/Front_end_koolitus.pptx
@@ -15,8 +15,8 @@
     <p:sldId id="257" r:id="rId6"/>
     <p:sldId id="258" r:id="rId7"/>
     <p:sldId id="259" r:id="rId8"/>
-    <p:sldId id="268" r:id="rId9"/>
-    <p:sldId id="260" r:id="rId10"/>
+    <p:sldId id="260" r:id="rId9"/>
+    <p:sldId id="269" r:id="rId10"/>
     <p:sldId id="266" r:id="rId11"/>
     <p:sldId id="267" r:id="rId12"/>
     <p:sldId id="261" r:id="rId13"/>
@@ -626,6 +626,193 @@
       </p:grpSpPr>
       <p:sp>
         <p:nvSpPr>
+          <p:cNvPr id="244" name="PlaceHolder 1"/>
+          <p:cNvSpPr>
+            <a:spLocks noGrp="1"/>
+          </p:cNvSpPr>
+          <p:nvPr>
+            <p:ph type="body"/>
+          </p:nvPr>
+        </p:nvSpPr>
+        <p:spPr>
+          <a:xfrm>
+            <a:off x="685800" y="4400640"/>
+            <a:ext cx="5485680" cy="3599640"/>
+          </a:xfrm>
+          <a:prstGeom prst="rect">
+            <a:avLst/>
+          </a:prstGeom>
+        </p:spPr>
+        <p:txBody>
+          <a:bodyPr lIns="0" tIns="0" rIns="0" bIns="0"/>
+          <a:lstStyle/>
+          <a:p>
+            <a:r>
+              <a:rPr lang="en-US" sz="2000" b="0" strike="noStrike" spc="-1">
+                <a:solidFill>
+                  <a:srgbClr val="000000"/>
+                </a:solidFill>
+                <a:uFill>
+                  <a:solidFill>
+                    <a:srgbClr val="FFFFFF"/>
+                  </a:solidFill>
+                </a:uFill>
+                <a:latin typeface="DejaVu Sans"/>
+              </a:rPr>
+              <a:t>Lõunasüsteem on nii, et sekretär annab igal päeval talongid Sina+õppijate arv, talongi väärtus 6 eur ja kehtib lähedalasuvates söögikohtades.</a:t>
+            </a:r>
+          </a:p>
+          <a:p>
+            <a:r>
+              <a:rPr lang="en-US" sz="2000" b="0" strike="noStrike" spc="-1">
+                <a:solidFill>
+                  <a:srgbClr val="000000"/>
+                </a:solidFill>
+                <a:uFill>
+                  <a:solidFill>
+                    <a:srgbClr val="FFFFFF"/>
+                  </a:solidFill>
+                </a:uFill>
+                <a:latin typeface="DejaVu Sans"/>
+              </a:rPr>
+              <a:t>Suitsetamise koht on väljas maja nurgas, sees kusagil suitsu teha ei saa.</a:t>
+            </a:r>
+          </a:p>
+          <a:p>
+            <a:r>
+              <a:rPr lang="en-US" sz="2000" b="0" strike="noStrike" spc="-1">
+                <a:solidFill>
+                  <a:srgbClr val="000000"/>
+                </a:solidFill>
+                <a:uFill>
+                  <a:solidFill>
+                    <a:srgbClr val="FFFFFF"/>
+                  </a:solidFill>
+                </a:uFill>
+                <a:latin typeface="DejaVu Sans"/>
+              </a:rPr>
+              <a:t>Kohvi ja snäkke võib kööginurgast igal ajal julgelt võtta palju kulub ja ok on klassi kaasa võtta.</a:t>
+            </a:r>
+          </a:p>
+          <a:p>
+            <a:r>
+              <a:rPr lang="en-US" sz="2000" b="0" strike="noStrike" spc="-1">
+                <a:solidFill>
+                  <a:srgbClr val="000000"/>
+                </a:solidFill>
+                <a:uFill>
+                  <a:solidFill>
+                    <a:srgbClr val="FFFFFF"/>
+                  </a:solidFill>
+                </a:uFill>
+                <a:latin typeface="DejaVu Sans"/>
+              </a:rPr>
+              <a:t>Parklas EP90 on parkimine tasuta, aga tuleb iga päev autonumber meie juures terminali sisestada.</a:t>
+            </a:r>
+          </a:p>
+        </p:txBody>
+      </p:sp>
+      <p:sp>
+        <p:nvSpPr>
+          <p:cNvPr id="245" name="CustomShape 2"/>
+          <p:cNvSpPr/>
+          <p:nvPr/>
+        </p:nvSpPr>
+        <p:spPr>
+          <a:xfrm>
+            <a:off x="3884760" y="8685360"/>
+            <a:ext cx="2971080" cy="457920"/>
+          </a:xfrm>
+          <a:prstGeom prst="rect">
+            <a:avLst/>
+          </a:prstGeom>
+          <a:noFill/>
+          <a:ln>
+            <a:noFill/>
+          </a:ln>
+        </p:spPr>
+        <p:style>
+          <a:lnRef idx="0">
+            <a:scrgbClr r="0" g="0" b="0"/>
+          </a:lnRef>
+          <a:fillRef idx="0">
+            <a:scrgbClr r="0" g="0" b="0"/>
+          </a:fillRef>
+          <a:effectRef idx="0">
+            <a:scrgbClr r="0" g="0" b="0"/>
+          </a:effectRef>
+          <a:fontRef idx="minor"/>
+        </p:style>
+        <p:txBody>
+          <a:bodyPr lIns="90000" tIns="45000" rIns="90000" bIns="45000" anchor="b"/>
+          <a:lstStyle/>
+          <a:p>
+            <a:pPr algn="r">
+              <a:lnSpc>
+                <a:spcPct val="100000"/>
+              </a:lnSpc>
+            </a:pPr>
+            <a:fld id="{DDFC10E9-96C9-4E54-B1BA-C96A8B01ED7C}" type="slidenum">
+              <a:rPr lang="en-US" sz="1200" b="0" strike="noStrike" spc="-1">
+                <a:solidFill>
+                  <a:srgbClr val="000000"/>
+                </a:solidFill>
+                <a:uFill>
+                  <a:solidFill>
+                    <a:srgbClr val="FFFFFF"/>
+                  </a:solidFill>
+                </a:uFill>
+                <a:latin typeface="+mn-lt"/>
+                <a:ea typeface="+mn-ea"/>
+              </a:rPr>
+              <a:t>11</a:t>
+            </a:fld>
+            <a:endParaRPr lang="en-US" sz="1200" b="0" strike="noStrike" spc="-1">
+              <a:solidFill>
+                <a:srgbClr val="000000"/>
+              </a:solidFill>
+              <a:uFill>
+                <a:solidFill>
+                  <a:srgbClr val="FFFFFF"/>
+                </a:solidFill>
+              </a:uFill>
+              <a:latin typeface="DejaVu Sans"/>
+            </a:endParaRPr>
+          </a:p>
+        </p:txBody>
+      </p:sp>
+    </p:spTree>
+    <p:extLst>
+      <p:ext uri="{BB962C8B-B14F-4D97-AF65-F5344CB8AC3E}">
+        <p14:creationId xmlns:p14="http://schemas.microsoft.com/office/powerpoint/2010/main" val="371318902"/>
+      </p:ext>
+    </p:extLst>
+  </p:cSld>
+  <p:clrMapOvr>
+    <a:masterClrMapping/>
+  </p:clrMapOvr>
+</p:notes>
+</file>
+
+<file path=ppt/notesSlides/notesSlide11.xml><?xml version="1.0" encoding="utf-8"?>
+<p:notes xmlns:a="http://schemas.openxmlformats.org/drawingml/2006/main" xmlns:r="http://schemas.openxmlformats.org/officeDocument/2006/relationships" xmlns:p="http://schemas.openxmlformats.org/presentationml/2006/main">
+  <p:cSld>
+    <p:spTree>
+      <p:nvGrpSpPr>
+        <p:cNvPr id="1" name=""/>
+        <p:cNvGrpSpPr/>
+        <p:nvPr/>
+      </p:nvGrpSpPr>
+      <p:grpSpPr>
+        <a:xfrm>
+          <a:off x="0" y="0"/>
+          <a:ext cx="0" cy="0"/>
+          <a:chOff x="0" y="0"/>
+          <a:chExt cx="0" cy="0"/>
+        </a:xfrm>
+      </p:grpSpPr>
+      <p:sp>
+        <p:nvSpPr>
           <p:cNvPr id="246" name="PlaceHolder 1"/>
           <p:cNvSpPr>
             <a:spLocks noGrp="1"/>
@@ -1131,7 +1318,7 @@
                 <a:latin typeface="+mn-lt"/>
                 <a:ea typeface="+mn-ea"/>
               </a:rPr>
-              <a:t>6</a:t>
+              <a:t>5</a:t>
             </a:fld>
             <a:endParaRPr lang="en-US" sz="1200" b="0" strike="noStrike" spc="-1">
               <a:solidFill>
@@ -1270,7 +1457,7 @@
                 <a:latin typeface="+mn-lt"/>
                 <a:ea typeface="+mn-ea"/>
               </a:rPr>
-              <a:t>7</a:t>
+              <a:t>6</a:t>
             </a:fld>
             <a:endParaRPr lang="en-US" sz="1200" b="0" strike="noStrike" spc="-1">
               <a:solidFill>
@@ -1289,7 +1476,7 @@
     </p:spTree>
     <p:extLst>
       <p:ext uri="{BB962C8B-B14F-4D97-AF65-F5344CB8AC3E}">
-        <p14:creationId xmlns:p14="http://schemas.microsoft.com/office/powerpoint/2010/main" val="3535457683"/>
+        <p14:creationId xmlns:p14="http://schemas.microsoft.com/office/powerpoint/2010/main" val="3978290949"/>
       </p:ext>
     </p:extLst>
   </p:cSld>
@@ -1409,7 +1596,7 @@
                 <a:latin typeface="+mn-lt"/>
                 <a:ea typeface="+mn-ea"/>
               </a:rPr>
-              <a:t>8</a:t>
+              <a:t>7</a:t>
             </a:fld>
             <a:endParaRPr lang="en-US" sz="1200" b="0" strike="noStrike" spc="-1">
               <a:solidFill>
@@ -1428,7 +1615,7 @@
     </p:spTree>
     <p:extLst>
       <p:ext uri="{BB962C8B-B14F-4D97-AF65-F5344CB8AC3E}">
-        <p14:creationId xmlns:p14="http://schemas.microsoft.com/office/powerpoint/2010/main" val="1537415598"/>
+        <p14:creationId xmlns:p14="http://schemas.microsoft.com/office/powerpoint/2010/main" val="3535457683"/>
       </p:ext>
     </p:extLst>
   </p:cSld>
@@ -1457,7 +1644,7 @@
       </p:grpSpPr>
       <p:sp>
         <p:nvSpPr>
-          <p:cNvPr id="240" name="PlaceHolder 1"/>
+          <p:cNvPr id="238" name="PlaceHolder 1"/>
           <p:cNvSpPr>
             <a:spLocks noGrp="1"/>
           </p:cNvSpPr>
@@ -1490,14 +1677,14 @@
                 </a:uFill>
                 <a:latin typeface="DejaVu Sans"/>
               </a:rPr>
-              <a:t>Hetkel slaidil meie nö vaikimisi päevaplaan</a:t>
+              <a:t>Koht, kus annad sõna osalejale – millist infot neilt enne koolituse algust soovid</a:t>
             </a:r>
           </a:p>
         </p:txBody>
       </p:sp>
       <p:sp>
         <p:nvSpPr>
-          <p:cNvPr id="241" name="CustomShape 2"/>
+          <p:cNvPr id="239" name="CustomShape 2"/>
           <p:cNvSpPr/>
           <p:nvPr/>
         </p:nvSpPr>
@@ -1535,7 +1722,7 @@
                 <a:spcPct val="100000"/>
               </a:lnSpc>
             </a:pPr>
-            <a:fld id="{9A65CC69-6773-42CC-A584-C943A68AD7F4}" type="slidenum">
+            <a:fld id="{359CF65B-057D-467C-8418-0E38A90564D0}" type="slidenum">
               <a:rPr lang="en-US" sz="1200" b="0" strike="noStrike" spc="-1">
                 <a:solidFill>
                   <a:srgbClr val="000000"/>
@@ -1548,7 +1735,7 @@
                 <a:latin typeface="+mn-lt"/>
                 <a:ea typeface="+mn-ea"/>
               </a:rPr>
-              <a:t>9</a:t>
+              <a:t>8</a:t>
             </a:fld>
             <a:endParaRPr lang="en-US" sz="1200" b="0" strike="noStrike" spc="-1">
               <a:solidFill>
@@ -1567,7 +1754,7 @@
     </p:spTree>
     <p:extLst>
       <p:ext uri="{BB962C8B-B14F-4D97-AF65-F5344CB8AC3E}">
-        <p14:creationId xmlns:p14="http://schemas.microsoft.com/office/powerpoint/2010/main" val="392307661"/>
+        <p14:creationId xmlns:p14="http://schemas.microsoft.com/office/powerpoint/2010/main" val="1537415598"/>
       </p:ext>
     </p:extLst>
   </p:cSld>
@@ -1596,7 +1783,7 @@
       </p:grpSpPr>
       <p:sp>
         <p:nvSpPr>
-          <p:cNvPr id="242" name="PlaceHolder 1"/>
+          <p:cNvPr id="240" name="PlaceHolder 1"/>
           <p:cNvSpPr>
             <a:spLocks noGrp="1"/>
           </p:cNvSpPr>
@@ -1629,14 +1816,14 @@
                 </a:uFill>
                 <a:latin typeface="DejaVu Sans"/>
               </a:rPr>
-              <a:t>Põgusalt koolituse teemad, mida koolitusel käsitletakse.</a:t>
+              <a:t>Hetkel slaidil meie nö vaikimisi päevaplaan</a:t>
             </a:r>
           </a:p>
         </p:txBody>
       </p:sp>
       <p:sp>
         <p:nvSpPr>
-          <p:cNvPr id="243" name="CustomShape 2"/>
+          <p:cNvPr id="241" name="CustomShape 2"/>
           <p:cNvSpPr/>
           <p:nvPr/>
         </p:nvSpPr>
@@ -1674,7 +1861,7 @@
                 <a:spcPct val="100000"/>
               </a:lnSpc>
             </a:pPr>
-            <a:fld id="{BA1D8E63-3816-4B55-8AF3-CA0E0432D9BF}" type="slidenum">
+            <a:fld id="{9A65CC69-6773-42CC-A584-C943A68AD7F4}" type="slidenum">
               <a:rPr lang="en-US" sz="1200" b="0" strike="noStrike" spc="-1">
                 <a:solidFill>
                   <a:srgbClr val="000000"/>
@@ -1687,7 +1874,7 @@
                 <a:latin typeface="+mn-lt"/>
                 <a:ea typeface="+mn-ea"/>
               </a:rPr>
-              <a:t>10</a:t>
+              <a:t>9</a:t>
             </a:fld>
             <a:endParaRPr lang="en-US" sz="1200" b="0" strike="noStrike" spc="-1">
               <a:solidFill>
@@ -1706,7 +1893,7 @@
     </p:spTree>
     <p:extLst>
       <p:ext uri="{BB962C8B-B14F-4D97-AF65-F5344CB8AC3E}">
-        <p14:creationId xmlns:p14="http://schemas.microsoft.com/office/powerpoint/2010/main" val="193537136"/>
+        <p14:creationId xmlns:p14="http://schemas.microsoft.com/office/powerpoint/2010/main" val="392307661"/>
       </p:ext>
     </p:extLst>
   </p:cSld>
@@ -1735,7 +1922,7 @@
       </p:grpSpPr>
       <p:sp>
         <p:nvSpPr>
-          <p:cNvPr id="244" name="PlaceHolder 1"/>
+          <p:cNvPr id="242" name="PlaceHolder 1"/>
           <p:cNvSpPr>
             <a:spLocks noGrp="1"/>
           </p:cNvSpPr>
@@ -1768,62 +1955,14 @@
                 </a:uFill>
                 <a:latin typeface="DejaVu Sans"/>
               </a:rPr>
-              <a:t>Lõunasüsteem on nii, et sekretär annab igal päeval talongid Sina+õppijate arv, talongi väärtus 6 eur ja kehtib lähedalasuvates söögikohtades.</a:t>
+              <a:t>Põgusalt koolituse teemad, mida koolitusel käsitletakse.</a:t>
             </a:r>
           </a:p>
-          <a:p>
-            <a:r>
-              <a:rPr lang="en-US" sz="2000" b="0" strike="noStrike" spc="-1">
-                <a:solidFill>
-                  <a:srgbClr val="000000"/>
-                </a:solidFill>
-                <a:uFill>
-                  <a:solidFill>
-                    <a:srgbClr val="FFFFFF"/>
-                  </a:solidFill>
-                </a:uFill>
-                <a:latin typeface="DejaVu Sans"/>
-              </a:rPr>
-              <a:t>Suitsetamise koht on väljas maja nurgas, sees kusagil suitsu teha ei saa.</a:t>
-            </a:r>
-          </a:p>
-          <a:p>
-            <a:r>
-              <a:rPr lang="en-US" sz="2000" b="0" strike="noStrike" spc="-1">
-                <a:solidFill>
-                  <a:srgbClr val="000000"/>
-                </a:solidFill>
-                <a:uFill>
-                  <a:solidFill>
-                    <a:srgbClr val="FFFFFF"/>
-                  </a:solidFill>
-                </a:uFill>
-                <a:latin typeface="DejaVu Sans"/>
-              </a:rPr>
-              <a:t>Kohvi ja snäkke võib kööginurgast igal ajal julgelt võtta palju kulub ja ok on klassi kaasa võtta.</a:t>
-            </a:r>
-          </a:p>
-          <a:p>
-            <a:r>
-              <a:rPr lang="en-US" sz="2000" b="0" strike="noStrike" spc="-1">
-                <a:solidFill>
-                  <a:srgbClr val="000000"/>
-                </a:solidFill>
-                <a:uFill>
-                  <a:solidFill>
-                    <a:srgbClr val="FFFFFF"/>
-                  </a:solidFill>
-                </a:uFill>
-                <a:latin typeface="DejaVu Sans"/>
-              </a:rPr>
-              <a:t>Parklas EP90 on parkimine tasuta, aga tuleb iga päev autonumber meie juures terminali sisestada.</a:t>
-            </a:r>
-          </a:p>
-        </p:txBody>
-      </p:sp>
-      <p:sp>
-        <p:nvSpPr>
-          <p:cNvPr id="245" name="CustomShape 2"/>
+        </p:txBody>
+      </p:sp>
+      <p:sp>
+        <p:nvSpPr>
+          <p:cNvPr id="243" name="CustomShape 2"/>
           <p:cNvSpPr/>
           <p:nvPr/>
         </p:nvSpPr>
@@ -1861,7 +2000,7 @@
                 <a:spcPct val="100000"/>
               </a:lnSpc>
             </a:pPr>
-            <a:fld id="{DDFC10E9-96C9-4E54-B1BA-C96A8B01ED7C}" type="slidenum">
+            <a:fld id="{BA1D8E63-3816-4B55-8AF3-CA0E0432D9BF}" type="slidenum">
               <a:rPr lang="en-US" sz="1200" b="0" strike="noStrike" spc="-1">
                 <a:solidFill>
                   <a:srgbClr val="000000"/>
@@ -1874,7 +2013,7 @@
                 <a:latin typeface="+mn-lt"/>
                 <a:ea typeface="+mn-ea"/>
               </a:rPr>
-              <a:t>11</a:t>
+              <a:t>10</a:t>
             </a:fld>
             <a:endParaRPr lang="en-US" sz="1200" b="0" strike="noStrike" spc="-1">
               <a:solidFill>
@@ -1893,7 +2032,7 @@
     </p:spTree>
     <p:extLst>
       <p:ext uri="{BB962C8B-B14F-4D97-AF65-F5344CB8AC3E}">
-        <p14:creationId xmlns:p14="http://schemas.microsoft.com/office/powerpoint/2010/main" val="371318902"/>
+        <p14:creationId xmlns:p14="http://schemas.microsoft.com/office/powerpoint/2010/main" val="193537136"/>
       </p:ext>
     </p:extLst>
   </p:cSld>
@@ -10767,9 +10906,6 @@
               </a:rPr>
               <a:t> info@koolitus.ee</a:t>
             </a:r>
-            <a:r>
-              <a:t/>
-            </a:r>
             <a:br/>
             <a:r>
               <a:rPr lang="en-US" sz="2400" b="0" strike="noStrike" spc="-1">
@@ -13945,7 +14081,7 @@
               <a:buChar char="•"/>
             </a:pPr>
             <a:r>
-              <a:rPr lang="en-US" sz="2800" b="0" strike="noStrike" spc="-1" dirty="0" err="1" smtClean="0">
+              <a:rPr lang="en-US" sz="2800" b="0" strike="noStrike" spc="-1" dirty="0" err="1">
                 <a:solidFill>
                   <a:srgbClr val="595959"/>
                 </a:solidFill>
@@ -13959,7 +14095,7 @@
               <a:t>Nimi</a:t>
             </a:r>
             <a:r>
-              <a:rPr lang="en-US" sz="2800" b="0" strike="noStrike" spc="-1" dirty="0" smtClean="0">
+              <a:rPr lang="en-US" sz="2800" b="0" strike="noStrike" spc="-1" dirty="0">
                 <a:solidFill>
                   <a:srgbClr val="595959"/>
                 </a:solidFill>
@@ -13973,7 +14109,7 @@
               <a:t>: Rain </a:t>
             </a:r>
             <a:r>
-              <a:rPr lang="en-US" sz="2800" b="0" strike="noStrike" spc="-1" dirty="0" err="1" smtClean="0">
+              <a:rPr lang="en-US" sz="2800" b="0" strike="noStrike" spc="-1" dirty="0" err="1">
                 <a:solidFill>
                   <a:srgbClr val="595959"/>
                 </a:solidFill>
@@ -14041,7 +14177,7 @@
               <a:t> </a:t>
             </a:r>
             <a:r>
-              <a:rPr lang="en-US" sz="2800" b="0" strike="noStrike" spc="-1" dirty="0" err="1" smtClean="0">
+              <a:rPr lang="en-US" sz="2800" b="0" strike="noStrike" spc="-1" dirty="0" err="1">
                 <a:solidFill>
                   <a:srgbClr val="595959"/>
                 </a:solidFill>
@@ -14055,7 +14191,7 @@
               <a:t>kogemus</a:t>
             </a:r>
             <a:r>
-              <a:rPr lang="en-US" sz="2800" b="0" strike="noStrike" spc="-1" dirty="0" smtClean="0">
+              <a:rPr lang="en-US" sz="2800" b="0" strike="noStrike" spc="-1" dirty="0">
                 <a:solidFill>
                   <a:srgbClr val="595959"/>
                 </a:solidFill>
@@ -14069,7 +14205,7 @@
               <a:t>: </a:t>
             </a:r>
             <a:r>
-              <a:rPr lang="en-US" sz="2800" b="0" strike="noStrike" spc="-1" dirty="0" err="1" smtClean="0">
+              <a:rPr lang="en-US" sz="2800" b="0" strike="noStrike" spc="-1" dirty="0" err="1">
                 <a:solidFill>
                   <a:srgbClr val="595959"/>
                 </a:solidFill>
@@ -14130,7 +14266,7 @@
               <a:buChar char="•"/>
             </a:pPr>
             <a:r>
-              <a:rPr lang="en-US" sz="2800" b="0" strike="noStrike" spc="-1" dirty="0" err="1" smtClean="0">
+              <a:rPr lang="en-US" sz="2800" b="0" strike="noStrike" spc="-1" dirty="0" err="1">
                 <a:solidFill>
                   <a:srgbClr val="595959"/>
                 </a:solidFill>
@@ -14144,7 +14280,7 @@
               <a:t>Ootused</a:t>
             </a:r>
             <a:r>
-              <a:rPr lang="en-US" sz="2800" b="0" strike="noStrike" spc="-1" dirty="0" smtClean="0">
+              <a:rPr lang="en-US" sz="2800" b="0" strike="noStrike" spc="-1" dirty="0">
                 <a:solidFill>
                   <a:srgbClr val="595959"/>
                 </a:solidFill>
@@ -14158,7 +14294,7 @@
               <a:t>: </a:t>
             </a:r>
             <a:r>
-              <a:rPr lang="en-US" sz="2800" b="0" strike="noStrike" spc="-1" smtClean="0">
+              <a:rPr lang="en-US" sz="2800" b="0" strike="noStrike" spc="-1">
                 <a:solidFill>
                   <a:srgbClr val="595959"/>
                 </a:solidFill>
@@ -14239,17 +14375,133 @@
       </p:grpSpPr>
       <p:sp>
         <p:nvSpPr>
-          <p:cNvPr id="3" name="Subtitle 2"/>
-          <p:cNvSpPr>
-            <a:spLocks noGrp="1"/>
-          </p:cNvSpPr>
-          <p:nvPr>
-            <p:ph type="subTitle"/>
-          </p:nvPr>
-        </p:nvSpPr>
-        <p:spPr/>
-        <p:txBody>
-          <a:bodyPr/>
+          <p:cNvPr id="216" name="CustomShape 1"/>
+          <p:cNvSpPr/>
+          <p:nvPr/>
+        </p:nvSpPr>
+        <p:spPr>
+          <a:xfrm>
+            <a:off x="481320" y="365040"/>
+            <a:ext cx="11266920" cy="1324800"/>
+          </a:xfrm>
+          <a:prstGeom prst="rect">
+            <a:avLst/>
+          </a:prstGeom>
+          <a:noFill/>
+          <a:ln>
+            <a:noFill/>
+          </a:ln>
+        </p:spPr>
+        <p:style>
+          <a:lnRef idx="0">
+            <a:scrgbClr r="0" g="0" b="0"/>
+          </a:lnRef>
+          <a:fillRef idx="0">
+            <a:scrgbClr r="0" g="0" b="0"/>
+          </a:fillRef>
+          <a:effectRef idx="0">
+            <a:scrgbClr r="0" g="0" b="0"/>
+          </a:effectRef>
+          <a:fontRef idx="minor"/>
+        </p:style>
+        <p:txBody>
+          <a:bodyPr lIns="90000" tIns="45000" rIns="90000" bIns="45000" anchor="ctr"/>
+          <a:lstStyle/>
+          <a:p>
+            <a:pPr>
+              <a:lnSpc>
+                <a:spcPct val="90000"/>
+              </a:lnSpc>
+            </a:pPr>
+            <a:r>
+              <a:rPr lang="en-US" sz="4400" b="0" strike="noStrike" spc="-1" dirty="0" err="1">
+                <a:solidFill>
+                  <a:srgbClr val="FC0D1B"/>
+                </a:solidFill>
+                <a:uFill>
+                  <a:solidFill>
+                    <a:srgbClr val="FFFFFF"/>
+                  </a:solidFill>
+                </a:uFill>
+                <a:latin typeface="Calibri Light"/>
+              </a:rPr>
+              <a:t>Saame</a:t>
+            </a:r>
+            <a:r>
+              <a:rPr lang="en-US" sz="4400" b="0" strike="noStrike" spc="-1" dirty="0">
+                <a:solidFill>
+                  <a:srgbClr val="FC0D1B"/>
+                </a:solidFill>
+                <a:uFill>
+                  <a:solidFill>
+                    <a:srgbClr val="FFFFFF"/>
+                  </a:solidFill>
+                </a:uFill>
+                <a:latin typeface="Calibri Light"/>
+              </a:rPr>
+              <a:t> </a:t>
+            </a:r>
+            <a:r>
+              <a:rPr lang="en-US" sz="4400" b="0" strike="noStrike" spc="-1" dirty="0" err="1">
+                <a:solidFill>
+                  <a:srgbClr val="FC0D1B"/>
+                </a:solidFill>
+                <a:uFill>
+                  <a:solidFill>
+                    <a:srgbClr val="FFFFFF"/>
+                  </a:solidFill>
+                </a:uFill>
+                <a:latin typeface="Calibri Light"/>
+              </a:rPr>
+              <a:t>tuttavaks</a:t>
+            </a:r>
+            <a:endParaRPr lang="en-US" sz="4400" b="0" strike="noStrike" spc="-1" dirty="0">
+              <a:solidFill>
+                <a:srgbClr val="000000"/>
+              </a:solidFill>
+              <a:uFill>
+                <a:solidFill>
+                  <a:srgbClr val="FFFFFF"/>
+                </a:solidFill>
+              </a:uFill>
+              <a:latin typeface="DejaVu Sans"/>
+            </a:endParaRPr>
+          </a:p>
+        </p:txBody>
+      </p:sp>
+      <p:sp>
+        <p:nvSpPr>
+          <p:cNvPr id="217" name="CustomShape 2"/>
+          <p:cNvSpPr/>
+          <p:nvPr/>
+        </p:nvSpPr>
+        <p:spPr>
+          <a:xfrm>
+            <a:off x="481320" y="1825560"/>
+            <a:ext cx="11266920" cy="3372120"/>
+          </a:xfrm>
+          <a:prstGeom prst="rect">
+            <a:avLst/>
+          </a:prstGeom>
+          <a:noFill/>
+          <a:ln>
+            <a:noFill/>
+          </a:ln>
+        </p:spPr>
+        <p:style>
+          <a:lnRef idx="0">
+            <a:scrgbClr r="0" g="0" b="0"/>
+          </a:lnRef>
+          <a:fillRef idx="0">
+            <a:scrgbClr r="0" g="0" b="0"/>
+          </a:fillRef>
+          <a:effectRef idx="0">
+            <a:scrgbClr r="0" g="0" b="0"/>
+          </a:effectRef>
+          <a:fontRef idx="minor"/>
+        </p:style>
+        <p:txBody>
+          <a:bodyPr lIns="90000" tIns="45000" rIns="90000" bIns="45000"/>
           <a:lstStyle/>
           <a:p>
             <a:pPr marL="720">
@@ -14261,7 +14513,7 @@
               </a:buClr>
             </a:pPr>
             <a:r>
-              <a:rPr lang="en-US" spc="-1" dirty="0" err="1">
+              <a:rPr lang="en-US" sz="2800" spc="-1" dirty="0" err="1">
                 <a:solidFill>
                   <a:srgbClr val="595959"/>
                 </a:solidFill>
@@ -14275,7 +14527,7 @@
               <a:t>Nimi</a:t>
             </a:r>
             <a:r>
-              <a:rPr lang="en-US" spc="-1" dirty="0">
+              <a:rPr lang="en-US" sz="2800" spc="-1" dirty="0">
                 <a:solidFill>
                   <a:srgbClr val="595959"/>
                 </a:solidFill>
@@ -14286,21 +14538,7 @@
                 </a:uFill>
                 <a:latin typeface="Calibri"/>
               </a:rPr>
-              <a:t>: </a:t>
-            </a:r>
-            <a:r>
-              <a:rPr lang="en-US" spc="-1" dirty="0" smtClean="0">
-                <a:solidFill>
-                  <a:srgbClr val="595959"/>
-                </a:solidFill>
-                <a:uFill>
-                  <a:solidFill>
-                    <a:srgbClr val="FFFFFF"/>
-                  </a:solidFill>
-                </a:uFill>
-                <a:latin typeface="Calibri"/>
-              </a:rPr>
-              <a:t>Henry;</a:t>
+              <a:t>: Henry;</a:t>
             </a:r>
           </a:p>
           <a:p>
@@ -14313,7 +14551,7 @@
               </a:buClr>
             </a:pPr>
             <a:r>
-              <a:rPr lang="en-US" spc="-1" dirty="0" err="1" smtClean="0">
+              <a:rPr lang="en-US" sz="2800" spc="-1" dirty="0" err="1">
                 <a:solidFill>
                   <a:srgbClr val="595959"/>
                 </a:solidFill>
@@ -14327,7 +14565,7 @@
               <a:t>Varasem</a:t>
             </a:r>
             <a:r>
-              <a:rPr lang="en-US" spc="-1" dirty="0" smtClean="0">
+              <a:rPr lang="en-US" sz="2800" spc="-1" dirty="0">
                 <a:solidFill>
                   <a:srgbClr val="595959"/>
                 </a:solidFill>
@@ -14341,7 +14579,7 @@
               <a:t> </a:t>
             </a:r>
             <a:r>
-              <a:rPr lang="en-US" spc="-1" dirty="0" err="1" smtClean="0">
+              <a:rPr lang="en-US" sz="2800" spc="-1" dirty="0" err="1">
                 <a:solidFill>
                   <a:srgbClr val="595959"/>
                 </a:solidFill>
@@ -14355,7 +14593,7 @@
               <a:t>kogemus</a:t>
             </a:r>
             <a:r>
-              <a:rPr lang="en-US" spc="-1" dirty="0" smtClean="0">
+              <a:rPr lang="en-US" sz="2800" spc="-1" dirty="0">
                 <a:solidFill>
                   <a:srgbClr val="595959"/>
                 </a:solidFill>
@@ -14369,7 +14607,7 @@
               <a:t>: </a:t>
             </a:r>
             <a:r>
-              <a:rPr lang="en-US" spc="-1" dirty="0" err="1" smtClean="0">
+              <a:rPr lang="en-US" sz="2800" spc="-1" dirty="0" err="1">
                 <a:solidFill>
                   <a:srgbClr val="595959"/>
                 </a:solidFill>
@@ -14383,7 +14621,7 @@
               <a:t>avalik</a:t>
             </a:r>
             <a:r>
-              <a:rPr lang="en-US" spc="-1" dirty="0" smtClean="0">
+              <a:rPr lang="en-US" sz="2800" spc="-1" dirty="0">
                 <a:solidFill>
                   <a:srgbClr val="595959"/>
                 </a:solidFill>
@@ -14397,7 +14635,7 @@
               <a:t> </a:t>
             </a:r>
             <a:r>
-              <a:rPr lang="en-US" spc="-1" dirty="0" err="1" smtClean="0">
+              <a:rPr lang="en-US" sz="2800" spc="-1" dirty="0" err="1">
                 <a:solidFill>
                   <a:srgbClr val="595959"/>
                 </a:solidFill>
@@ -14411,7 +14649,7 @@
               <a:t>sektor</a:t>
             </a:r>
             <a:r>
-              <a:rPr lang="en-US" spc="-1" dirty="0" smtClean="0">
+              <a:rPr lang="en-US" sz="2800" spc="-1" dirty="0">
                 <a:solidFill>
                   <a:srgbClr val="595959"/>
                 </a:solidFill>
@@ -14424,7 +14662,7 @@
               </a:rPr>
               <a:t>;</a:t>
             </a:r>
-            <a:endParaRPr lang="en-US" spc="-1" dirty="0">
+            <a:endParaRPr lang="en-US" sz="2800" spc="-1" dirty="0">
               <a:solidFill>
                 <a:srgbClr val="000000"/>
               </a:solidFill>
@@ -14448,7 +14686,7 @@
               <a:buChar char="•"/>
             </a:pPr>
             <a:r>
-              <a:rPr lang="en-US" spc="-1" dirty="0" err="1" smtClean="0">
+              <a:rPr lang="en-US" sz="2800" spc="-1" dirty="0" err="1">
                 <a:solidFill>
                   <a:srgbClr val="595959"/>
                 </a:solidFill>
@@ -14462,7 +14700,7 @@
               <a:t>Ootused</a:t>
             </a:r>
             <a:r>
-              <a:rPr lang="en-US" spc="-1" dirty="0" smtClean="0">
+              <a:rPr lang="en-US" sz="2800" spc="-1" dirty="0">
                 <a:solidFill>
                   <a:srgbClr val="595959"/>
                 </a:solidFill>
@@ -14476,7 +14714,7 @@
               <a:t>: </a:t>
             </a:r>
             <a:r>
-              <a:rPr lang="en-US" spc="-1" dirty="0" err="1" smtClean="0">
+              <a:rPr lang="en-US" sz="2800" spc="-1" dirty="0" err="1">
                 <a:solidFill>
                   <a:srgbClr val="595959"/>
                 </a:solidFill>
@@ -14490,7 +14728,7 @@
               <a:t>kinnistada</a:t>
             </a:r>
             <a:r>
-              <a:rPr lang="en-US" spc="-1" dirty="0" smtClean="0">
+              <a:rPr lang="en-US" sz="2800" spc="-1" dirty="0">
                 <a:solidFill>
                   <a:srgbClr val="595959"/>
                 </a:solidFill>
@@ -14504,7 +14742,7 @@
               <a:t> </a:t>
             </a:r>
             <a:r>
-              <a:rPr lang="en-US" spc="-1" dirty="0" err="1" smtClean="0">
+              <a:rPr lang="en-US" sz="2800" spc="-1" dirty="0" err="1">
                 <a:solidFill>
                   <a:srgbClr val="595959"/>
                 </a:solidFill>
@@ -14518,7 +14756,7 @@
               <a:t>teadmise</a:t>
             </a:r>
             <a:r>
-              <a:rPr lang="en-US" spc="-1" dirty="0" smtClean="0">
+              <a:rPr lang="en-US" sz="2800" spc="-1" dirty="0">
                 <a:solidFill>
                   <a:srgbClr val="595959"/>
                 </a:solidFill>
@@ -14529,38 +14767,10 @@
                 </a:uFill>
                 <a:latin typeface="Calibri"/>
               </a:rPr>
-              <a:t> </a:t>
+              <a:t> ja </a:t>
             </a:r>
             <a:r>
-              <a:rPr lang="en-US" spc="-1" dirty="0" err="1" smtClean="0">
-                <a:solidFill>
-                  <a:srgbClr val="595959"/>
-                </a:solidFill>
-                <a:uFill>
-                  <a:solidFill>
-                    <a:srgbClr val="FFFFFF"/>
-                  </a:solidFill>
-                </a:uFill>
-                <a:latin typeface="Calibri"/>
-              </a:rPr>
-              <a:t>ja</a:t>
-            </a:r>
-            <a:r>
-              <a:rPr lang="en-US" spc="-1" dirty="0" smtClean="0">
-                <a:solidFill>
-                  <a:srgbClr val="595959"/>
-                </a:solidFill>
-                <a:uFill>
-                  <a:solidFill>
-                    <a:srgbClr val="FFFFFF"/>
-                  </a:solidFill>
-                </a:uFill>
-                <a:latin typeface="Calibri"/>
-              </a:rPr>
-              <a:t> </a:t>
-            </a:r>
-            <a:r>
-              <a:rPr lang="en-US" spc="-1" dirty="0" err="1" smtClean="0">
+              <a:rPr lang="en-US" sz="2800" spc="-1" dirty="0" err="1">
                 <a:solidFill>
                   <a:srgbClr val="595959"/>
                 </a:solidFill>
@@ -14574,7 +14784,7 @@
               <a:t>laiendada</a:t>
             </a:r>
             <a:r>
-              <a:rPr lang="en-US" spc="-1" dirty="0" smtClean="0">
+              <a:rPr lang="en-US" sz="2800" spc="-1" dirty="0">
                 <a:solidFill>
                   <a:srgbClr val="595959"/>
                 </a:solidFill>
@@ -14588,7 +14798,7 @@
               <a:t> HMTL, CSS, JavaScript </a:t>
             </a:r>
             <a:r>
-              <a:rPr lang="en-US" spc="-1" dirty="0" err="1" smtClean="0">
+              <a:rPr lang="en-US" sz="2800" spc="-1" dirty="0" err="1">
                 <a:solidFill>
                   <a:srgbClr val="595959"/>
                 </a:solidFill>
@@ -14602,7 +14812,7 @@
               <a:t>oskusi</a:t>
             </a:r>
             <a:r>
-              <a:rPr lang="en-US" spc="-1" dirty="0" smtClean="0">
+              <a:rPr lang="en-US" sz="2800" spc="-1" dirty="0">
                 <a:solidFill>
                   <a:srgbClr val="595959"/>
                 </a:solidFill>
@@ -14615,108 +14825,42 @@
               </a:rPr>
               <a:t>;</a:t>
             </a:r>
-            <a:endParaRPr lang="et-EE" dirty="0"/>
-          </a:p>
-        </p:txBody>
-      </p:sp>
-      <p:sp>
-        <p:nvSpPr>
-          <p:cNvPr id="2" name="Title 1"/>
-          <p:cNvSpPr>
-            <a:spLocks noGrp="1"/>
-          </p:cNvSpPr>
-          <p:nvPr>
-            <p:ph type="title"/>
-          </p:nvPr>
-        </p:nvSpPr>
-        <p:spPr/>
-        <p:txBody>
-          <a:bodyPr/>
-          <a:lstStyle/>
-          <a:p>
-            <a:r>
-              <a:rPr lang="en-US" spc="-1" dirty="0" err="1">
-                <a:solidFill>
-                  <a:srgbClr val="FC0D1B"/>
-                </a:solidFill>
-                <a:uFill>
-                  <a:solidFill>
-                    <a:srgbClr val="FFFFFF"/>
-                  </a:solidFill>
-                </a:uFill>
-                <a:latin typeface="Calibri Light"/>
-              </a:rPr>
-              <a:t>Saame</a:t>
-            </a:r>
-            <a:r>
-              <a:rPr lang="en-US" spc="-1" dirty="0">
-                <a:solidFill>
-                  <a:srgbClr val="FC0D1B"/>
-                </a:solidFill>
-                <a:uFill>
-                  <a:solidFill>
-                    <a:srgbClr val="FFFFFF"/>
-                  </a:solidFill>
-                </a:uFill>
-                <a:latin typeface="Calibri Light"/>
-              </a:rPr>
-              <a:t> </a:t>
-            </a:r>
-            <a:r>
-              <a:rPr lang="en-US" spc="-1" dirty="0" err="1">
-                <a:solidFill>
-                  <a:srgbClr val="FC0D1B"/>
-                </a:solidFill>
-                <a:uFill>
-                  <a:solidFill>
-                    <a:srgbClr val="FFFFFF"/>
-                  </a:solidFill>
-                </a:uFill>
-                <a:latin typeface="Calibri Light"/>
-              </a:rPr>
-              <a:t>tuttavaks</a:t>
-            </a:r>
-            <a:r>
-              <a:rPr lang="en-US" spc="-1" dirty="0">
-                <a:solidFill>
-                  <a:srgbClr val="000000"/>
-                </a:solidFill>
-                <a:uFill>
-                  <a:solidFill>
-                    <a:srgbClr val="FFFFFF"/>
-                  </a:solidFill>
-                </a:uFill>
-                <a:latin typeface="DejaVu Sans"/>
-              </a:rPr>
-              <a:t/>
-            </a:r>
-            <a:br>
-              <a:rPr lang="en-US" spc="-1" dirty="0">
-                <a:solidFill>
-                  <a:srgbClr val="000000"/>
-                </a:solidFill>
-                <a:uFill>
-                  <a:solidFill>
-                    <a:srgbClr val="FFFFFF"/>
-                  </a:solidFill>
-                </a:uFill>
-                <a:latin typeface="DejaVu Sans"/>
-              </a:rPr>
-            </a:br>
-            <a:endParaRPr lang="et-EE" dirty="0"/>
+            <a:endParaRPr lang="et-EE" sz="2800" dirty="0"/>
           </a:p>
         </p:txBody>
       </p:sp>
     </p:spTree>
-    <p:extLst>
-      <p:ext uri="{BB962C8B-B14F-4D97-AF65-F5344CB8AC3E}">
-        <p14:creationId xmlns:p14="http://schemas.microsoft.com/office/powerpoint/2010/main" val="2670244549"/>
-      </p:ext>
-    </p:extLst>
   </p:cSld>
   <p:clrMapOvr>
     <a:masterClrMapping/>
   </p:clrMapOvr>
+  <p:timing>
+    <p:tnLst>
+      <p:par>
+        <p:cTn id="1" dur="indefinite" restart="never" nodeType="tmRoot">
+          <p:childTnLst>
+            <p:seq>
+              <p:cTn id="2" nodeType="mainSeq"/>
+              <p:prevCondLst>
+                <p:cond evt="onPrev" delay="0">
+                  <p:tgtEl>
+                    <p:sldTgt/>
+                  </p:tgtEl>
+                </p:cond>
+              </p:prevCondLst>
+              <p:nextCondLst>
+                <p:cond evt="onNext" delay="0">
+                  <p:tgtEl>
+                    <p:sldTgt/>
+                  </p:tgtEl>
+                </p:cond>
+              </p:nextCondLst>
+            </p:seq>
+          </p:childTnLst>
+        </p:cTn>
+      </p:par>
+    </p:tnLst>
+  </p:timing>
 </p:sld>
 </file>
 
@@ -14880,7 +15024,7 @@
               </a:buClr>
             </a:pPr>
             <a:r>
-              <a:rPr lang="en-US" sz="2800" b="0" strike="noStrike" spc="-1" dirty="0" err="1" smtClean="0">
+              <a:rPr lang="en-US" sz="2800" b="0" strike="noStrike" spc="-1" dirty="0" err="1">
                 <a:solidFill>
                   <a:srgbClr val="595959"/>
                 </a:solidFill>
@@ -14894,7 +15038,7 @@
               <a:t>Nimi</a:t>
             </a:r>
             <a:r>
-              <a:rPr lang="en-US" sz="2800" b="0" strike="noStrike" spc="-1" dirty="0" smtClean="0">
+              <a:rPr lang="en-US" sz="2800" b="0" strike="noStrike" spc="-1" dirty="0">
                 <a:solidFill>
                   <a:srgbClr val="595959"/>
                 </a:solidFill>
@@ -14908,7 +15052,7 @@
               <a:t>: Mona-</a:t>
             </a:r>
             <a:r>
-              <a:rPr lang="en-US" sz="2800" b="0" strike="noStrike" spc="-1" dirty="0" err="1" smtClean="0">
+              <a:rPr lang="en-US" sz="2800" b="0" strike="noStrike" spc="-1" dirty="0" err="1">
                 <a:solidFill>
                   <a:srgbClr val="595959"/>
                 </a:solidFill>
@@ -14976,7 +15120,7 @@
               <a:t> </a:t>
             </a:r>
             <a:r>
-              <a:rPr lang="en-US" sz="2800" b="0" strike="noStrike" spc="-1" dirty="0" err="1" smtClean="0">
+              <a:rPr lang="en-US" sz="2800" b="0" strike="noStrike" spc="-1" dirty="0" err="1">
                 <a:solidFill>
                   <a:srgbClr val="595959"/>
                 </a:solidFill>
@@ -14990,7 +15134,7 @@
               <a:t>kogemus</a:t>
             </a:r>
             <a:r>
-              <a:rPr lang="en-US" sz="2800" b="0" strike="noStrike" spc="-1" dirty="0" smtClean="0">
+              <a:rPr lang="en-US" sz="2800" b="0" strike="noStrike" spc="-1" dirty="0">
                 <a:solidFill>
                   <a:srgbClr val="595959"/>
                 </a:solidFill>
@@ -15051,7 +15195,7 @@
               <a:buChar char="•"/>
             </a:pPr>
             <a:r>
-              <a:rPr lang="en-US" sz="2800" b="0" strike="noStrike" spc="-1" dirty="0" err="1" smtClean="0">
+              <a:rPr lang="en-US" sz="2800" b="0" strike="noStrike" spc="-1" dirty="0" err="1">
                 <a:solidFill>
                   <a:srgbClr val="595959"/>
                 </a:solidFill>
@@ -15065,7 +15209,7 @@
               <a:t>Ootused</a:t>
             </a:r>
             <a:r>
-              <a:rPr lang="en-US" sz="2800" b="0" strike="noStrike" spc="-1" dirty="0" smtClean="0">
+              <a:rPr lang="en-US" sz="2800" b="0" strike="noStrike" spc="-1" dirty="0">
                 <a:solidFill>
                   <a:srgbClr val="595959"/>
                 </a:solidFill>
@@ -15079,7 +15223,7 @@
               <a:t> web </a:t>
             </a:r>
             <a:r>
-              <a:rPr lang="en-US" sz="2800" b="0" strike="noStrike" spc="-1" dirty="0" err="1" smtClean="0">
+              <a:rPr lang="en-US" sz="2800" b="0" strike="noStrike" spc="-1" dirty="0" err="1">
                 <a:solidFill>
                   <a:srgbClr val="595959"/>
                 </a:solidFill>
@@ -15107,6 +15251,11 @@
         </p:txBody>
       </p:sp>
     </p:spTree>
+    <p:extLst>
+      <p:ext uri="{BB962C8B-B14F-4D97-AF65-F5344CB8AC3E}">
+        <p14:creationId xmlns:p14="http://schemas.microsoft.com/office/powerpoint/2010/main" val="2651605015"/>
+      </p:ext>
+    </p:extLst>
   </p:cSld>
   <p:clrMapOvr>
     <a:masterClrMapping/>
@@ -15273,7 +15422,7 @@
               </a:buClr>
             </a:pPr>
             <a:r>
-              <a:rPr lang="en-US" sz="2800" b="0" strike="noStrike" spc="-1" dirty="0" err="1" smtClean="0">
+              <a:rPr lang="en-US" sz="2800" b="0" strike="noStrike" spc="-1" dirty="0" err="1">
                 <a:solidFill>
                   <a:srgbClr val="595959"/>
                 </a:solidFill>
@@ -15287,7 +15436,7 @@
               <a:t>Nimi</a:t>
             </a:r>
             <a:r>
-              <a:rPr lang="en-US" sz="2800" b="0" strike="noStrike" spc="-1" dirty="0" smtClean="0">
+              <a:rPr lang="en-US" sz="2800" b="0" strike="noStrike" spc="-1" dirty="0">
                 <a:solidFill>
                   <a:srgbClr val="595959"/>
                 </a:solidFill>
@@ -15301,7 +15450,7 @@
               <a:t>: </a:t>
             </a:r>
             <a:r>
-              <a:rPr lang="et-EE" sz="2800" b="0" strike="noStrike" spc="-1" dirty="0" smtClean="0">
+              <a:rPr lang="et-EE" sz="2800" b="0" strike="noStrike" spc="-1" dirty="0">
                 <a:solidFill>
                   <a:srgbClr val="595959"/>
                 </a:solidFill>
@@ -15369,7 +15518,7 @@
               <a:t> </a:t>
             </a:r>
             <a:r>
-              <a:rPr lang="en-US" sz="2800" b="0" strike="noStrike" spc="-1" dirty="0" err="1" smtClean="0">
+              <a:rPr lang="en-US" sz="2800" b="0" strike="noStrike" spc="-1" dirty="0" err="1">
                 <a:solidFill>
                   <a:srgbClr val="595959"/>
                 </a:solidFill>
@@ -15383,7 +15532,7 @@
               <a:t>kogemus</a:t>
             </a:r>
             <a:r>
-              <a:rPr lang="en-US" sz="2800" b="0" strike="noStrike" spc="-1" dirty="0" smtClean="0">
+              <a:rPr lang="en-US" sz="2800" b="0" strike="noStrike" spc="-1" dirty="0">
                 <a:solidFill>
                   <a:srgbClr val="595959"/>
                 </a:solidFill>
@@ -15397,7 +15546,7 @@
               <a:t>: </a:t>
             </a:r>
             <a:r>
-              <a:rPr lang="et-EE" sz="2800" b="0" strike="noStrike" spc="-1" dirty="0" smtClean="0">
+              <a:rPr lang="et-EE" sz="2800" b="0" strike="noStrike" spc="-1" dirty="0">
                 <a:solidFill>
                   <a:srgbClr val="595959"/>
                 </a:solidFill>
@@ -15458,7 +15607,7 @@
               <a:buChar char="•"/>
             </a:pPr>
             <a:r>
-              <a:rPr lang="en-US" sz="2800" b="0" strike="noStrike" spc="-1" dirty="0" err="1" smtClean="0">
+              <a:rPr lang="en-US" sz="2800" b="0" strike="noStrike" spc="-1" dirty="0" err="1">
                 <a:solidFill>
                   <a:srgbClr val="595959"/>
                 </a:solidFill>
@@ -15472,7 +15621,7 @@
               <a:t>Ootused</a:t>
             </a:r>
             <a:r>
-              <a:rPr lang="en-US" sz="2800" b="0" strike="noStrike" spc="-1" dirty="0" smtClean="0">
+              <a:rPr lang="en-US" sz="2800" b="0" strike="noStrike" spc="-1" dirty="0">
                 <a:solidFill>
                   <a:srgbClr val="595959"/>
                 </a:solidFill>
@@ -15486,7 +15635,7 @@
               <a:t> web </a:t>
             </a:r>
             <a:r>
-              <a:rPr lang="en-US" sz="2800" b="0" strike="noStrike" spc="-1" dirty="0" err="1" smtClean="0">
+              <a:rPr lang="en-US" sz="2800" b="0" strike="noStrike" spc="-1" dirty="0" err="1">
                 <a:solidFill>
                   <a:srgbClr val="595959"/>
                 </a:solidFill>
@@ -15500,7 +15649,7 @@
               <a:t>kasutusmugavus</a:t>
             </a:r>
             <a:r>
-              <a:rPr lang="et-EE" sz="2800" b="0" strike="noStrike" spc="-1" dirty="0" smtClean="0">
+              <a:rPr lang="et-EE" sz="2800" b="0" strike="noStrike" spc="-1" dirty="0">
                 <a:solidFill>
                   <a:srgbClr val="595959"/>
                 </a:solidFill>
@@ -15514,7 +15663,7 @@
               <a:t>, </a:t>
             </a:r>
             <a:r>
-              <a:rPr lang="et-EE" sz="2800" b="0" strike="noStrike" spc="-1" smtClean="0">
+              <a:rPr lang="et-EE" sz="2800" b="0" strike="noStrike" spc="-1">
                 <a:solidFill>
                   <a:srgbClr val="595959"/>
                 </a:solidFill>
@@ -15713,7 +15862,7 @@
               </a:buClr>
             </a:pPr>
             <a:r>
-              <a:rPr lang="en-US" sz="2800" b="0" strike="noStrike" spc="-1" dirty="0" err="1" smtClean="0">
+              <a:rPr lang="en-US" sz="2800" b="0" strike="noStrike" spc="-1" dirty="0" err="1">
                 <a:solidFill>
                   <a:srgbClr val="595959"/>
                 </a:solidFill>
@@ -15727,7 +15876,7 @@
               <a:t>Nimi</a:t>
             </a:r>
             <a:r>
-              <a:rPr lang="en-US" sz="2800" b="0" strike="noStrike" spc="-1" dirty="0" smtClean="0">
+              <a:rPr lang="en-US" sz="2800" b="0" strike="noStrike" spc="-1" dirty="0">
                 <a:solidFill>
                   <a:srgbClr val="595959"/>
                 </a:solidFill>
@@ -15741,7 +15890,7 @@
               <a:t>: </a:t>
             </a:r>
             <a:r>
-              <a:rPr lang="et-EE" sz="2800" b="0" strike="noStrike" spc="-1" dirty="0" smtClean="0">
+              <a:rPr lang="et-EE" sz="2800" b="0" strike="noStrike" spc="-1" dirty="0">
                 <a:solidFill>
                   <a:srgbClr val="595959"/>
                 </a:solidFill>
@@ -15809,7 +15958,7 @@
               <a:t> </a:t>
             </a:r>
             <a:r>
-              <a:rPr lang="en-US" sz="2800" b="0" strike="noStrike" spc="-1" dirty="0" err="1" smtClean="0">
+              <a:rPr lang="en-US" sz="2800" b="0" strike="noStrike" spc="-1" dirty="0" err="1">
                 <a:solidFill>
                   <a:srgbClr val="595959"/>
                 </a:solidFill>
@@ -15823,7 +15972,7 @@
               <a:t>kogemus</a:t>
             </a:r>
             <a:r>
-              <a:rPr lang="en-US" sz="2800" b="0" strike="noStrike" spc="-1" dirty="0" smtClean="0">
+              <a:rPr lang="en-US" sz="2800" b="0" strike="noStrike" spc="-1" dirty="0">
                 <a:solidFill>
                   <a:srgbClr val="595959"/>
                 </a:solidFill>
@@ -15837,7 +15986,7 @@
               <a:t>: </a:t>
             </a:r>
             <a:r>
-              <a:rPr lang="et-EE" sz="2800" b="0" strike="noStrike" spc="-1" dirty="0" smtClean="0">
+              <a:rPr lang="et-EE" sz="2800" b="0" strike="noStrike" spc="-1" dirty="0">
                 <a:solidFill>
                   <a:srgbClr val="595959"/>
                 </a:solidFill>
@@ -15898,7 +16047,7 @@
               <a:buChar char="•"/>
             </a:pPr>
             <a:r>
-              <a:rPr lang="en-US" sz="2800" b="0" strike="noStrike" spc="-1" dirty="0" err="1" smtClean="0">
+              <a:rPr lang="en-US" sz="2800" b="0" strike="noStrike" spc="-1" dirty="0" err="1">
                 <a:solidFill>
                   <a:srgbClr val="595959"/>
                 </a:solidFill>
@@ -15912,7 +16061,7 @@
               <a:t>Ootused</a:t>
             </a:r>
             <a:r>
-              <a:rPr lang="en-US" sz="2800" b="0" strike="noStrike" spc="-1" dirty="0" smtClean="0">
+              <a:rPr lang="en-US" sz="2800" b="0" strike="noStrike" spc="-1" dirty="0">
                 <a:solidFill>
                   <a:srgbClr val="595959"/>
                 </a:solidFill>
@@ -15926,7 +16075,7 @@
               <a:t> web </a:t>
             </a:r>
             <a:r>
-              <a:rPr lang="en-US" sz="2800" b="0" strike="noStrike" spc="-1" dirty="0" err="1" smtClean="0">
+              <a:rPr lang="en-US" sz="2800" b="0" strike="noStrike" spc="-1" dirty="0" err="1">
                 <a:solidFill>
                   <a:srgbClr val="595959"/>
                 </a:solidFill>
@@ -15940,7 +16089,7 @@
               <a:t>kasutusmugavus</a:t>
             </a:r>
             <a:r>
-              <a:rPr lang="et-EE" sz="2800" b="0" strike="noStrike" spc="-1" dirty="0" smtClean="0">
+              <a:rPr lang="et-EE" sz="2800" b="0" strike="noStrike" spc="-1" dirty="0">
                 <a:solidFill>
                   <a:srgbClr val="595959"/>
                 </a:solidFill>
@@ -15954,7 +16103,7 @@
               <a:t>, </a:t>
             </a:r>
             <a:r>
-              <a:rPr lang="et-EE" sz="2800" b="0" strike="noStrike" spc="-1" smtClean="0">
+              <a:rPr lang="et-EE" sz="2800" b="0" strike="noStrike" spc="-1">
                 <a:solidFill>
                   <a:srgbClr val="595959"/>
                 </a:solidFill>

</xml_diff>